<commit_message>
Add a bit of info about the front-end
</commit_message>
<xml_diff>
--- a/Christmas Bar.pptx
+++ b/Christmas Bar.pptx
@@ -5,11 +5,12 @@
     <p:sldMasterId id="2147483648" r:id="rId1"/>
   </p:sldMasterIdLst>
   <p:notesMasterIdLst>
-    <p:notesMasterId r:id="rId4"/>
+    <p:notesMasterId r:id="rId5"/>
   </p:notesMasterIdLst>
   <p:sldIdLst>
     <p:sldId id="258" r:id="rId2"/>
     <p:sldId id="259" r:id="rId3"/>
+    <p:sldId id="260" r:id="rId4"/>
   </p:sldIdLst>
   <p:sldSz cx="9144000" cy="6858000" type="screen4x3"/>
   <p:notesSz cx="6858000" cy="9144000"/>
@@ -5908,6 +5909,644 @@
       </p:par>
     </p:tnLst>
   </p:timing>
+</p:sld>
+</file>
+
+<file path=ppt/slides/slide3.xml><?xml version="1.0" encoding="utf-8"?>
+<p:sld xmlns:a="http://schemas.openxmlformats.org/drawingml/2006/main" xmlns:r="http://schemas.openxmlformats.org/officeDocument/2006/relationships" xmlns:p="http://schemas.openxmlformats.org/presentationml/2006/main">
+  <p:cSld>
+    <p:spTree>
+      <p:nvGrpSpPr>
+        <p:cNvPr id="1" name=""/>
+        <p:cNvGrpSpPr/>
+        <p:nvPr/>
+      </p:nvGrpSpPr>
+      <p:grpSpPr>
+        <a:xfrm>
+          <a:off x="0" y="0"/>
+          <a:ext cx="0" cy="0"/>
+          <a:chOff x="0" y="0"/>
+          <a:chExt cx="0" cy="0"/>
+        </a:xfrm>
+      </p:grpSpPr>
+      <p:sp>
+        <p:nvSpPr>
+          <p:cNvPr id="29" name="Rectangle 28"/>
+          <p:cNvSpPr/>
+          <p:nvPr/>
+        </p:nvSpPr>
+        <p:spPr>
+          <a:xfrm>
+            <a:off x="5616116" y="2348880"/>
+            <a:ext cx="2484276" cy="3816424"/>
+          </a:xfrm>
+          <a:prstGeom prst="rect">
+            <a:avLst/>
+          </a:prstGeom>
+          <a:noFill/>
+          <a:ln w="76200">
+            <a:solidFill>
+              <a:schemeClr val="accent1"/>
+            </a:solidFill>
+            <a:prstDash val="sysDash"/>
+          </a:ln>
+        </p:spPr>
+        <p:style>
+          <a:lnRef idx="2">
+            <a:schemeClr val="accent1">
+              <a:shade val="50000"/>
+            </a:schemeClr>
+          </a:lnRef>
+          <a:fillRef idx="1">
+            <a:schemeClr val="accent1"/>
+          </a:fillRef>
+          <a:effectRef idx="0">
+            <a:schemeClr val="accent1"/>
+          </a:effectRef>
+          <a:fontRef idx="minor">
+            <a:schemeClr val="lt1"/>
+          </a:fontRef>
+        </p:style>
+        <p:txBody>
+          <a:bodyPr rtlCol="0" anchor="ctr"/>
+          <a:lstStyle/>
+          <a:p>
+            <a:pPr algn="ctr"/>
+            <a:endParaRPr lang="en-GB"/>
+          </a:p>
+        </p:txBody>
+      </p:sp>
+      <p:sp>
+        <p:nvSpPr>
+          <p:cNvPr id="2" name="Title 1"/>
+          <p:cNvSpPr>
+            <a:spLocks noGrp="1"/>
+          </p:cNvSpPr>
+          <p:nvPr>
+            <p:ph type="title"/>
+          </p:nvPr>
+        </p:nvSpPr>
+        <p:spPr/>
+        <p:txBody>
+          <a:bodyPr/>
+          <a:lstStyle/>
+          <a:p>
+            <a:r>
+              <a:rPr lang="en-GB" dirty="0" smtClean="0"/>
+              <a:t>Vue.js App</a:t>
+            </a:r>
+            <a:endParaRPr lang="en-GB" dirty="0"/>
+          </a:p>
+        </p:txBody>
+      </p:sp>
+      <p:sp>
+        <p:nvSpPr>
+          <p:cNvPr id="4" name="Rounded Rectangle 3"/>
+          <p:cNvSpPr/>
+          <p:nvPr/>
+        </p:nvSpPr>
+        <p:spPr>
+          <a:xfrm>
+            <a:off x="899592" y="2636912"/>
+            <a:ext cx="1944216" cy="1080120"/>
+          </a:xfrm>
+          <a:prstGeom prst="roundRect">
+            <a:avLst/>
+          </a:prstGeom>
+        </p:spPr>
+        <p:style>
+          <a:lnRef idx="1">
+            <a:schemeClr val="dk1"/>
+          </a:lnRef>
+          <a:fillRef idx="2">
+            <a:schemeClr val="dk1"/>
+          </a:fillRef>
+          <a:effectRef idx="1">
+            <a:schemeClr val="dk1"/>
+          </a:effectRef>
+          <a:fontRef idx="minor">
+            <a:schemeClr val="dk1"/>
+          </a:fontRef>
+        </p:style>
+        <p:txBody>
+          <a:bodyPr rtlCol="0" anchor="ctr"/>
+          <a:lstStyle/>
+          <a:p>
+            <a:pPr algn="ctr"/>
+            <a:r>
+              <a:rPr lang="en-GB" dirty="0" err="1" smtClean="0"/>
+              <a:t>Login.vue</a:t>
+            </a:r>
+            <a:endParaRPr lang="en-GB" dirty="0"/>
+          </a:p>
+        </p:txBody>
+      </p:sp>
+      <p:sp>
+        <p:nvSpPr>
+          <p:cNvPr id="5" name="Rounded Rectangle 4"/>
+          <p:cNvSpPr/>
+          <p:nvPr/>
+        </p:nvSpPr>
+        <p:spPr>
+          <a:xfrm>
+            <a:off x="3419872" y="2636912"/>
+            <a:ext cx="1944216" cy="1080120"/>
+          </a:xfrm>
+          <a:prstGeom prst="roundRect">
+            <a:avLst/>
+          </a:prstGeom>
+        </p:spPr>
+        <p:style>
+          <a:lnRef idx="1">
+            <a:schemeClr val="dk1"/>
+          </a:lnRef>
+          <a:fillRef idx="2">
+            <a:schemeClr val="dk1"/>
+          </a:fillRef>
+          <a:effectRef idx="1">
+            <a:schemeClr val="dk1"/>
+          </a:effectRef>
+          <a:fontRef idx="minor">
+            <a:schemeClr val="dk1"/>
+          </a:fontRef>
+        </p:style>
+        <p:txBody>
+          <a:bodyPr rtlCol="0" anchor="ctr"/>
+          <a:lstStyle/>
+          <a:p>
+            <a:pPr algn="ctr"/>
+            <a:r>
+              <a:rPr lang="en-GB" dirty="0" err="1" smtClean="0"/>
+              <a:t>DrinkList.vue</a:t>
+            </a:r>
+            <a:endParaRPr lang="en-GB" dirty="0"/>
+          </a:p>
+        </p:txBody>
+      </p:sp>
+      <p:sp>
+        <p:nvSpPr>
+          <p:cNvPr id="6" name="Rounded Rectangle 5"/>
+          <p:cNvSpPr/>
+          <p:nvPr/>
+        </p:nvSpPr>
+        <p:spPr>
+          <a:xfrm>
+            <a:off x="3418898" y="4224698"/>
+            <a:ext cx="1944216" cy="1080120"/>
+          </a:xfrm>
+          <a:prstGeom prst="roundRect">
+            <a:avLst/>
+          </a:prstGeom>
+        </p:spPr>
+        <p:style>
+          <a:lnRef idx="1">
+            <a:schemeClr val="dk1"/>
+          </a:lnRef>
+          <a:fillRef idx="2">
+            <a:schemeClr val="dk1"/>
+          </a:fillRef>
+          <a:effectRef idx="1">
+            <a:schemeClr val="dk1"/>
+          </a:effectRef>
+          <a:fontRef idx="minor">
+            <a:schemeClr val="dk1"/>
+          </a:fontRef>
+        </p:style>
+        <p:txBody>
+          <a:bodyPr rtlCol="0" anchor="ctr"/>
+          <a:lstStyle/>
+          <a:p>
+            <a:pPr algn="ctr"/>
+            <a:r>
+              <a:rPr lang="en-GB" dirty="0" err="1" smtClean="0"/>
+              <a:t>DrinkDetails.vue</a:t>
+            </a:r>
+            <a:endParaRPr lang="en-GB" dirty="0"/>
+          </a:p>
+        </p:txBody>
+      </p:sp>
+      <p:sp>
+        <p:nvSpPr>
+          <p:cNvPr id="7" name="Rounded Rectangle 6"/>
+          <p:cNvSpPr/>
+          <p:nvPr/>
+        </p:nvSpPr>
+        <p:spPr>
+          <a:xfrm>
+            <a:off x="5868144" y="4221088"/>
+            <a:ext cx="1944216" cy="1080120"/>
+          </a:xfrm>
+          <a:prstGeom prst="roundRect">
+            <a:avLst/>
+          </a:prstGeom>
+        </p:spPr>
+        <p:style>
+          <a:lnRef idx="1">
+            <a:schemeClr val="dk1"/>
+          </a:lnRef>
+          <a:fillRef idx="2">
+            <a:schemeClr val="dk1"/>
+          </a:fillRef>
+          <a:effectRef idx="1">
+            <a:schemeClr val="dk1"/>
+          </a:effectRef>
+          <a:fontRef idx="minor">
+            <a:schemeClr val="dk1"/>
+          </a:fontRef>
+        </p:style>
+        <p:txBody>
+          <a:bodyPr rtlCol="0" anchor="ctr"/>
+          <a:lstStyle/>
+          <a:p>
+            <a:pPr algn="ctr"/>
+            <a:r>
+              <a:rPr lang="en-GB" sz="1400" dirty="0" err="1" smtClean="0"/>
+              <a:t>DrinkEditDetails.vue</a:t>
+            </a:r>
+            <a:endParaRPr lang="en-GB" sz="1400" dirty="0"/>
+          </a:p>
+        </p:txBody>
+      </p:sp>
+      <p:sp>
+        <p:nvSpPr>
+          <p:cNvPr id="8" name="Rounded Rectangle 7"/>
+          <p:cNvSpPr/>
+          <p:nvPr/>
+        </p:nvSpPr>
+        <p:spPr>
+          <a:xfrm>
+            <a:off x="5868144" y="2642822"/>
+            <a:ext cx="1944216" cy="1080120"/>
+          </a:xfrm>
+          <a:prstGeom prst="roundRect">
+            <a:avLst/>
+          </a:prstGeom>
+        </p:spPr>
+        <p:style>
+          <a:lnRef idx="1">
+            <a:schemeClr val="dk1"/>
+          </a:lnRef>
+          <a:fillRef idx="2">
+            <a:schemeClr val="dk1"/>
+          </a:fillRef>
+          <a:effectRef idx="1">
+            <a:schemeClr val="dk1"/>
+          </a:effectRef>
+          <a:fontRef idx="minor">
+            <a:schemeClr val="dk1"/>
+          </a:fontRef>
+        </p:style>
+        <p:txBody>
+          <a:bodyPr rtlCol="0" anchor="ctr"/>
+          <a:lstStyle/>
+          <a:p>
+            <a:pPr algn="ctr"/>
+            <a:r>
+              <a:rPr lang="en-GB" dirty="0" err="1" smtClean="0"/>
+              <a:t>Butler.vue</a:t>
+            </a:r>
+            <a:endParaRPr lang="en-GB" dirty="0"/>
+          </a:p>
+        </p:txBody>
+      </p:sp>
+      <p:cxnSp>
+        <p:nvCxnSpPr>
+          <p:cNvPr id="10" name="Straight Arrow Connector 9"/>
+          <p:cNvCxnSpPr>
+            <a:stCxn id="4" idx="3"/>
+            <a:endCxn id="5" idx="1"/>
+          </p:cNvCxnSpPr>
+          <p:nvPr/>
+        </p:nvCxnSpPr>
+        <p:spPr>
+          <a:xfrm>
+            <a:off x="2843808" y="3176972"/>
+            <a:ext cx="576064" cy="0"/>
+          </a:xfrm>
+          <a:prstGeom prst="straightConnector1">
+            <a:avLst/>
+          </a:prstGeom>
+          <a:ln w="38100">
+            <a:solidFill>
+              <a:schemeClr val="tx1"/>
+            </a:solidFill>
+            <a:tailEnd type="arrow"/>
+          </a:ln>
+        </p:spPr>
+        <p:style>
+          <a:lnRef idx="1">
+            <a:schemeClr val="dk1"/>
+          </a:lnRef>
+          <a:fillRef idx="0">
+            <a:schemeClr val="dk1"/>
+          </a:fillRef>
+          <a:effectRef idx="0">
+            <a:schemeClr val="dk1"/>
+          </a:effectRef>
+          <a:fontRef idx="minor">
+            <a:schemeClr val="tx1"/>
+          </a:fontRef>
+        </p:style>
+      </p:cxnSp>
+      <p:cxnSp>
+        <p:nvCxnSpPr>
+          <p:cNvPr id="13" name="Elbow Connector 12"/>
+          <p:cNvCxnSpPr>
+            <a:stCxn id="4" idx="0"/>
+            <a:endCxn id="8" idx="0"/>
+          </p:cNvCxnSpPr>
+          <p:nvPr/>
+        </p:nvCxnSpPr>
+        <p:spPr>
+          <a:xfrm rot="16200000" flipH="1">
+            <a:off x="4353021" y="155591"/>
+            <a:ext cx="5910" cy="4968552"/>
+          </a:xfrm>
+          <a:prstGeom prst="bentConnector3">
+            <a:avLst>
+              <a:gd name="adj1" fmla="val -7846548"/>
+            </a:avLst>
+          </a:prstGeom>
+          <a:ln w="38100">
+            <a:solidFill>
+              <a:schemeClr val="tx1"/>
+            </a:solidFill>
+            <a:tailEnd type="arrow"/>
+          </a:ln>
+        </p:spPr>
+        <p:style>
+          <a:lnRef idx="1">
+            <a:schemeClr val="dk1"/>
+          </a:lnRef>
+          <a:fillRef idx="0">
+            <a:schemeClr val="dk1"/>
+          </a:fillRef>
+          <a:effectRef idx="0">
+            <a:schemeClr val="dk1"/>
+          </a:effectRef>
+          <a:fontRef idx="minor">
+            <a:schemeClr val="tx1"/>
+          </a:fontRef>
+        </p:style>
+      </p:cxnSp>
+      <p:cxnSp>
+        <p:nvCxnSpPr>
+          <p:cNvPr id="17" name="Straight Arrow Connector 16"/>
+          <p:cNvCxnSpPr>
+            <a:stCxn id="8" idx="1"/>
+            <a:endCxn id="5" idx="3"/>
+          </p:cNvCxnSpPr>
+          <p:nvPr/>
+        </p:nvCxnSpPr>
+        <p:spPr>
+          <a:xfrm flipH="1" flipV="1">
+            <a:off x="5364088" y="3176972"/>
+            <a:ext cx="504056" cy="5910"/>
+          </a:xfrm>
+          <a:prstGeom prst="straightConnector1">
+            <a:avLst/>
+          </a:prstGeom>
+          <a:ln w="38100">
+            <a:solidFill>
+              <a:schemeClr val="tx1"/>
+            </a:solidFill>
+            <a:tailEnd type="arrow"/>
+          </a:ln>
+        </p:spPr>
+        <p:style>
+          <a:lnRef idx="1">
+            <a:schemeClr val="dk1"/>
+          </a:lnRef>
+          <a:fillRef idx="0">
+            <a:schemeClr val="dk1"/>
+          </a:fillRef>
+          <a:effectRef idx="0">
+            <a:schemeClr val="dk1"/>
+          </a:effectRef>
+          <a:fontRef idx="minor">
+            <a:schemeClr val="tx1"/>
+          </a:fontRef>
+        </p:style>
+      </p:cxnSp>
+      <p:cxnSp>
+        <p:nvCxnSpPr>
+          <p:cNvPr id="18" name="Straight Arrow Connector 17"/>
+          <p:cNvCxnSpPr>
+            <a:stCxn id="5" idx="2"/>
+            <a:endCxn id="6" idx="0"/>
+          </p:cNvCxnSpPr>
+          <p:nvPr/>
+        </p:nvCxnSpPr>
+        <p:spPr>
+          <a:xfrm flipH="1">
+            <a:off x="4391006" y="3717032"/>
+            <a:ext cx="974" cy="507666"/>
+          </a:xfrm>
+          <a:prstGeom prst="straightConnector1">
+            <a:avLst/>
+          </a:prstGeom>
+          <a:ln w="38100">
+            <a:solidFill>
+              <a:schemeClr val="tx1"/>
+            </a:solidFill>
+            <a:tailEnd type="arrow"/>
+          </a:ln>
+        </p:spPr>
+        <p:style>
+          <a:lnRef idx="1">
+            <a:schemeClr val="dk1"/>
+          </a:lnRef>
+          <a:fillRef idx="0">
+            <a:schemeClr val="dk1"/>
+          </a:fillRef>
+          <a:effectRef idx="0">
+            <a:schemeClr val="dk1"/>
+          </a:effectRef>
+          <a:fontRef idx="minor">
+            <a:schemeClr val="tx1"/>
+          </a:fontRef>
+        </p:style>
+      </p:cxnSp>
+      <p:cxnSp>
+        <p:nvCxnSpPr>
+          <p:cNvPr id="22" name="Straight Arrow Connector 21"/>
+          <p:cNvCxnSpPr>
+            <a:stCxn id="5" idx="2"/>
+            <a:endCxn id="7" idx="0"/>
+          </p:cNvCxnSpPr>
+          <p:nvPr/>
+        </p:nvCxnSpPr>
+        <p:spPr>
+          <a:xfrm>
+            <a:off x="4391980" y="3717032"/>
+            <a:ext cx="2448272" cy="504056"/>
+          </a:xfrm>
+          <a:prstGeom prst="straightConnector1">
+            <a:avLst/>
+          </a:prstGeom>
+          <a:ln w="38100">
+            <a:solidFill>
+              <a:schemeClr val="tx1"/>
+            </a:solidFill>
+            <a:tailEnd type="arrow"/>
+          </a:ln>
+        </p:spPr>
+        <p:style>
+          <a:lnRef idx="1">
+            <a:schemeClr val="dk1"/>
+          </a:lnRef>
+          <a:fillRef idx="0">
+            <a:schemeClr val="dk1"/>
+          </a:fillRef>
+          <a:effectRef idx="0">
+            <a:schemeClr val="dk1"/>
+          </a:effectRef>
+          <a:fontRef idx="minor">
+            <a:schemeClr val="tx1"/>
+          </a:fontRef>
+        </p:style>
+      </p:cxnSp>
+      <p:cxnSp>
+        <p:nvCxnSpPr>
+          <p:cNvPr id="25" name="Straight Arrow Connector 24"/>
+          <p:cNvCxnSpPr>
+            <a:stCxn id="6" idx="3"/>
+            <a:endCxn id="7" idx="1"/>
+          </p:cNvCxnSpPr>
+          <p:nvPr/>
+        </p:nvCxnSpPr>
+        <p:spPr>
+          <a:xfrm flipV="1">
+            <a:off x="5363114" y="4761148"/>
+            <a:ext cx="505030" cy="3610"/>
+          </a:xfrm>
+          <a:prstGeom prst="straightConnector1">
+            <a:avLst/>
+          </a:prstGeom>
+          <a:ln w="38100">
+            <a:solidFill>
+              <a:schemeClr val="tx1"/>
+            </a:solidFill>
+            <a:tailEnd type="arrow"/>
+          </a:ln>
+        </p:spPr>
+        <p:style>
+          <a:lnRef idx="1">
+            <a:schemeClr val="dk1"/>
+          </a:lnRef>
+          <a:fillRef idx="0">
+            <a:schemeClr val="dk1"/>
+          </a:fillRef>
+          <a:effectRef idx="0">
+            <a:schemeClr val="dk1"/>
+          </a:effectRef>
+          <a:fontRef idx="minor">
+            <a:schemeClr val="tx1"/>
+          </a:fontRef>
+        </p:style>
+      </p:cxnSp>
+      <p:sp>
+        <p:nvSpPr>
+          <p:cNvPr id="28" name="TextBox 27"/>
+          <p:cNvSpPr txBox="1"/>
+          <p:nvPr/>
+        </p:nvSpPr>
+        <p:spPr>
+          <a:xfrm>
+            <a:off x="3547305" y="1772816"/>
+            <a:ext cx="1600759" cy="369332"/>
+          </a:xfrm>
+          <a:prstGeom prst="rect">
+            <a:avLst/>
+          </a:prstGeom>
+          <a:noFill/>
+        </p:spPr>
+        <p:txBody>
+          <a:bodyPr wrap="none" rtlCol="0">
+            <a:spAutoFit/>
+          </a:bodyPr>
+          <a:lstStyle/>
+          <a:p>
+            <a:r>
+              <a:rPr lang="en-GB" dirty="0" smtClean="0"/>
+              <a:t>If “Butler” </a:t>
+            </a:r>
+            <a:r>
+              <a:rPr lang="en-GB" dirty="0"/>
+              <a:t>u</a:t>
+            </a:r>
+            <a:r>
+              <a:rPr lang="en-GB" dirty="0" smtClean="0"/>
+              <a:t>ser</a:t>
+            </a:r>
+            <a:endParaRPr lang="en-GB" dirty="0"/>
+          </a:p>
+        </p:txBody>
+      </p:sp>
+      <p:sp>
+        <p:nvSpPr>
+          <p:cNvPr id="30" name="TextBox 29"/>
+          <p:cNvSpPr txBox="1"/>
+          <p:nvPr/>
+        </p:nvSpPr>
+        <p:spPr>
+          <a:xfrm>
+            <a:off x="5945183" y="5642084"/>
+            <a:ext cx="1826141" cy="523220"/>
+          </a:xfrm>
+          <a:prstGeom prst="rect">
+            <a:avLst/>
+          </a:prstGeom>
+          <a:noFill/>
+        </p:spPr>
+        <p:txBody>
+          <a:bodyPr wrap="none" rtlCol="0">
+            <a:spAutoFit/>
+          </a:bodyPr>
+          <a:lstStyle/>
+          <a:p>
+            <a:r>
+              <a:rPr lang="en-GB" sz="2800" dirty="0" smtClean="0">
+                <a:solidFill>
+                  <a:schemeClr val="accent1"/>
+                </a:solidFill>
+              </a:rPr>
+              <a:t>Butler </a:t>
+            </a:r>
+            <a:r>
+              <a:rPr lang="en-GB" sz="2800" dirty="0">
+                <a:solidFill>
+                  <a:schemeClr val="accent1"/>
+                </a:solidFill>
+              </a:rPr>
+              <a:t>O</a:t>
+            </a:r>
+            <a:r>
+              <a:rPr lang="en-GB" sz="2800" dirty="0" smtClean="0">
+                <a:solidFill>
+                  <a:schemeClr val="accent1"/>
+                </a:solidFill>
+              </a:rPr>
+              <a:t>nly</a:t>
+            </a:r>
+            <a:endParaRPr lang="en-GB" sz="2800" dirty="0">
+              <a:solidFill>
+                <a:schemeClr val="accent1"/>
+              </a:solidFill>
+            </a:endParaRPr>
+          </a:p>
+        </p:txBody>
+      </p:sp>
+    </p:spTree>
+    <p:extLst>
+      <p:ext uri="{BB962C8B-B14F-4D97-AF65-F5344CB8AC3E}">
+        <p14:creationId xmlns:p14="http://schemas.microsoft.com/office/powerpoint/2010/main" val="340496891"/>
+      </p:ext>
+    </p:extLst>
+  </p:cSld>
+  <p:clrMapOvr>
+    <a:masterClrMapping/>
+  </p:clrMapOvr>
 </p:sld>
 </file>
 

</xml_diff>